<commit_message>
Design Flow Report - Overview and outline, Flow-chart updated with Lucas feedback
git-svn-id: https://ntserv1.ida.ing.tu-bs.de/svn/hwswcosim/trunk@808 d83f2ebd-4275-1f45-b601-53736ebb63cd
</commit_message>
<xml_diff>
--- a/doc/socrocket_flow.pptx
+++ b/doc/socrocket_flow.pptx
@@ -289,7 +289,7 @@
             <a:fld id="{3F906118-738F-1C4E-8D54-680CFAF96838}" type="datetimeFigureOut">
               <a:rPr lang="de-DE" smtClean="0"/>
               <a:pPr/>
-              <a:t>24.02.2012</a:t>
+              <a:t>14.03.2012</a:t>
             </a:fld>
             <a:endParaRPr lang="en-US"/>
           </a:p>
@@ -456,7 +456,7 @@
             <a:fld id="{3F906118-738F-1C4E-8D54-680CFAF96838}" type="datetimeFigureOut">
               <a:rPr lang="de-DE" smtClean="0"/>
               <a:pPr/>
-              <a:t>24.02.2012</a:t>
+              <a:t>14.03.2012</a:t>
             </a:fld>
             <a:endParaRPr lang="en-US"/>
           </a:p>
@@ -633,7 +633,7 @@
             <a:fld id="{3F906118-738F-1C4E-8D54-680CFAF96838}" type="datetimeFigureOut">
               <a:rPr lang="de-DE" smtClean="0"/>
               <a:pPr/>
-              <a:t>24.02.2012</a:t>
+              <a:t>14.03.2012</a:t>
             </a:fld>
             <a:endParaRPr lang="en-US"/>
           </a:p>
@@ -800,7 +800,7 @@
             <a:fld id="{3F906118-738F-1C4E-8D54-680CFAF96838}" type="datetimeFigureOut">
               <a:rPr lang="de-DE" smtClean="0"/>
               <a:pPr/>
-              <a:t>24.02.2012</a:t>
+              <a:t>14.03.2012</a:t>
             </a:fld>
             <a:endParaRPr lang="en-US"/>
           </a:p>
@@ -1043,7 +1043,7 @@
             <a:fld id="{3F906118-738F-1C4E-8D54-680CFAF96838}" type="datetimeFigureOut">
               <a:rPr lang="de-DE" smtClean="0"/>
               <a:pPr/>
-              <a:t>24.02.2012</a:t>
+              <a:t>14.03.2012</a:t>
             </a:fld>
             <a:endParaRPr lang="en-US"/>
           </a:p>
@@ -1328,7 +1328,7 @@
             <a:fld id="{3F906118-738F-1C4E-8D54-680CFAF96838}" type="datetimeFigureOut">
               <a:rPr lang="de-DE" smtClean="0"/>
               <a:pPr/>
-              <a:t>24.02.2012</a:t>
+              <a:t>14.03.2012</a:t>
             </a:fld>
             <a:endParaRPr lang="en-US"/>
           </a:p>
@@ -1747,7 +1747,7 @@
             <a:fld id="{3F906118-738F-1C4E-8D54-680CFAF96838}" type="datetimeFigureOut">
               <a:rPr lang="de-DE" smtClean="0"/>
               <a:pPr/>
-              <a:t>24.02.2012</a:t>
+              <a:t>14.03.2012</a:t>
             </a:fld>
             <a:endParaRPr lang="en-US"/>
           </a:p>
@@ -1862,7 +1862,7 @@
             <a:fld id="{3F906118-738F-1C4E-8D54-680CFAF96838}" type="datetimeFigureOut">
               <a:rPr lang="de-DE" smtClean="0"/>
               <a:pPr/>
-              <a:t>24.02.2012</a:t>
+              <a:t>14.03.2012</a:t>
             </a:fld>
             <a:endParaRPr lang="en-US"/>
           </a:p>
@@ -1954,7 +1954,7 @@
             <a:fld id="{3F906118-738F-1C4E-8D54-680CFAF96838}" type="datetimeFigureOut">
               <a:rPr lang="de-DE" smtClean="0"/>
               <a:pPr/>
-              <a:t>24.02.2012</a:t>
+              <a:t>14.03.2012</a:t>
             </a:fld>
             <a:endParaRPr lang="en-US"/>
           </a:p>
@@ -2228,7 +2228,7 @@
             <a:fld id="{3F906118-738F-1C4E-8D54-680CFAF96838}" type="datetimeFigureOut">
               <a:rPr lang="de-DE" smtClean="0"/>
               <a:pPr/>
-              <a:t>24.02.2012</a:t>
+              <a:t>14.03.2012</a:t>
             </a:fld>
             <a:endParaRPr lang="en-US"/>
           </a:p>
@@ -2478,7 +2478,7 @@
             <a:fld id="{3F906118-738F-1C4E-8D54-680CFAF96838}" type="datetimeFigureOut">
               <a:rPr lang="de-DE" smtClean="0"/>
               <a:pPr/>
-              <a:t>24.02.2012</a:t>
+              <a:t>14.03.2012</a:t>
             </a:fld>
             <a:endParaRPr lang="en-US"/>
           </a:p>
@@ -2688,7 +2688,7 @@
             <a:fld id="{3F906118-738F-1C4E-8D54-680CFAF96838}" type="datetimeFigureOut">
               <a:rPr lang="de-DE" smtClean="0"/>
               <a:pPr/>
-              <a:t>24.02.2012</a:t>
+              <a:t>14.03.2012</a:t>
             </a:fld>
             <a:endParaRPr lang="en-US"/>
           </a:p>
@@ -3068,9 +3068,9 @@
         <p:grpSpPr>
           <a:xfrm>
             <a:off x="2981354" y="549464"/>
-            <a:ext cx="4206729" cy="5690470"/>
+            <a:ext cx="4073522" cy="5690470"/>
             <a:chOff x="2981354" y="549464"/>
-            <a:chExt cx="4206729" cy="5690470"/>
+            <a:chExt cx="4073522" cy="5690470"/>
           </a:xfrm>
         </p:grpSpPr>
         <p:cxnSp>
@@ -4066,18 +4066,18 @@
         <p:cxnSp>
           <p:nvCxnSpPr>
             <p:cNvPr id="160" name="Form 159"/>
-            <p:cNvCxnSpPr/>
+            <p:cNvCxnSpPr>
+              <a:endCxn id="65" idx="3"/>
+            </p:cNvCxnSpPr>
             <p:nvPr/>
           </p:nvCxnSpPr>
           <p:spPr>
             <a:xfrm rot="16200000" flipV="1">
-              <a:off x="6202323" y="1950522"/>
-              <a:ext cx="1066866" cy="602181"/>
+              <a:off x="5647175" y="1395375"/>
+              <a:ext cx="2038506" cy="740837"/>
             </a:xfrm>
-            <a:prstGeom prst="bentConnector3">
-              <a:avLst>
-                <a:gd name="adj1" fmla="val 99203"/>
-              </a:avLst>
+            <a:prstGeom prst="bentConnector2">
+              <a:avLst/>
             </a:prstGeom>
             <a:ln>
               <a:solidFill>
@@ -4147,7 +4147,7 @@
           </p:nvSpPr>
           <p:spPr>
             <a:xfrm>
-              <a:off x="6398722" y="1292668"/>
+              <a:off x="6265515" y="749519"/>
               <a:ext cx="789361" cy="400110"/>
             </a:xfrm>
             <a:prstGeom prst="rect">
@@ -4184,8 +4184,8 @@
           </p:nvSpPr>
           <p:spPr>
             <a:xfrm>
-              <a:off x="6286748" y="2382650"/>
-              <a:ext cx="892868" cy="400110"/>
+              <a:off x="6252880" y="2391117"/>
+              <a:ext cx="651854" cy="400110"/>
             </a:xfrm>
             <a:prstGeom prst="rect">
               <a:avLst/>
@@ -4207,7 +4207,7 @@
               </a:br>
               <a:r>
                 <a:rPr lang="en-US" sz="1000" dirty="0" smtClean="0"/>
-                <a:t>Configuration</a:t>
+                <a:t>Configur.</a:t>
               </a:r>
               <a:endParaRPr lang="en-US" sz="1000" dirty="0"/>
             </a:p>

</xml_diff>

<commit_message>
Design Flow Report - configuration section
git-svn-id: https://ntserv1.ida.ing.tu-bs.de/svn/hwswcosim/trunk@817 d83f2ebd-4275-1f45-b601-53736ebb63cd
</commit_message>
<xml_diff>
--- a/doc/socrocket_flow.pptx
+++ b/doc/socrocket_flow.pptx
@@ -6,6 +6,9 @@
   </p:sldMasterIdLst>
   <p:sldIdLst>
     <p:sldId id="256" r:id="rId2"/>
+    <p:sldId id="257" r:id="rId3"/>
+    <p:sldId id="258" r:id="rId4"/>
+    <p:sldId id="259" r:id="rId5"/>
   </p:sldIdLst>
   <p:sldSz cx="9144000" cy="6858000" type="screen4x3"/>
   <p:notesSz cx="6858000" cy="9144000"/>
@@ -289,7 +292,7 @@
             <a:fld id="{3F906118-738F-1C4E-8D54-680CFAF96838}" type="datetimeFigureOut">
               <a:rPr lang="de-DE" smtClean="0"/>
               <a:pPr/>
-              <a:t>14.03.2012</a:t>
+              <a:t>19.03.2012</a:t>
             </a:fld>
             <a:endParaRPr lang="en-US"/>
           </a:p>
@@ -456,7 +459,7 @@
             <a:fld id="{3F906118-738F-1C4E-8D54-680CFAF96838}" type="datetimeFigureOut">
               <a:rPr lang="de-DE" smtClean="0"/>
               <a:pPr/>
-              <a:t>14.03.2012</a:t>
+              <a:t>19.03.2012</a:t>
             </a:fld>
             <a:endParaRPr lang="en-US"/>
           </a:p>
@@ -633,7 +636,7 @@
             <a:fld id="{3F906118-738F-1C4E-8D54-680CFAF96838}" type="datetimeFigureOut">
               <a:rPr lang="de-DE" smtClean="0"/>
               <a:pPr/>
-              <a:t>14.03.2012</a:t>
+              <a:t>19.03.2012</a:t>
             </a:fld>
             <a:endParaRPr lang="en-US"/>
           </a:p>
@@ -800,7 +803,7 @@
             <a:fld id="{3F906118-738F-1C4E-8D54-680CFAF96838}" type="datetimeFigureOut">
               <a:rPr lang="de-DE" smtClean="0"/>
               <a:pPr/>
-              <a:t>14.03.2012</a:t>
+              <a:t>19.03.2012</a:t>
             </a:fld>
             <a:endParaRPr lang="en-US"/>
           </a:p>
@@ -1043,7 +1046,7 @@
             <a:fld id="{3F906118-738F-1C4E-8D54-680CFAF96838}" type="datetimeFigureOut">
               <a:rPr lang="de-DE" smtClean="0"/>
               <a:pPr/>
-              <a:t>14.03.2012</a:t>
+              <a:t>19.03.2012</a:t>
             </a:fld>
             <a:endParaRPr lang="en-US"/>
           </a:p>
@@ -1328,7 +1331,7 @@
             <a:fld id="{3F906118-738F-1C4E-8D54-680CFAF96838}" type="datetimeFigureOut">
               <a:rPr lang="de-DE" smtClean="0"/>
               <a:pPr/>
-              <a:t>14.03.2012</a:t>
+              <a:t>19.03.2012</a:t>
             </a:fld>
             <a:endParaRPr lang="en-US"/>
           </a:p>
@@ -1747,7 +1750,7 @@
             <a:fld id="{3F906118-738F-1C4E-8D54-680CFAF96838}" type="datetimeFigureOut">
               <a:rPr lang="de-DE" smtClean="0"/>
               <a:pPr/>
-              <a:t>14.03.2012</a:t>
+              <a:t>19.03.2012</a:t>
             </a:fld>
             <a:endParaRPr lang="en-US"/>
           </a:p>
@@ -1862,7 +1865,7 @@
             <a:fld id="{3F906118-738F-1C4E-8D54-680CFAF96838}" type="datetimeFigureOut">
               <a:rPr lang="de-DE" smtClean="0"/>
               <a:pPr/>
-              <a:t>14.03.2012</a:t>
+              <a:t>19.03.2012</a:t>
             </a:fld>
             <a:endParaRPr lang="en-US"/>
           </a:p>
@@ -1954,7 +1957,7 @@
             <a:fld id="{3F906118-738F-1C4E-8D54-680CFAF96838}" type="datetimeFigureOut">
               <a:rPr lang="de-DE" smtClean="0"/>
               <a:pPr/>
-              <a:t>14.03.2012</a:t>
+              <a:t>19.03.2012</a:t>
             </a:fld>
             <a:endParaRPr lang="en-US"/>
           </a:p>
@@ -2228,7 +2231,7 @@
             <a:fld id="{3F906118-738F-1C4E-8D54-680CFAF96838}" type="datetimeFigureOut">
               <a:rPr lang="de-DE" smtClean="0"/>
               <a:pPr/>
-              <a:t>14.03.2012</a:t>
+              <a:t>19.03.2012</a:t>
             </a:fld>
             <a:endParaRPr lang="en-US"/>
           </a:p>
@@ -2478,7 +2481,7 @@
             <a:fld id="{3F906118-738F-1C4E-8D54-680CFAF96838}" type="datetimeFigureOut">
               <a:rPr lang="de-DE" smtClean="0"/>
               <a:pPr/>
-              <a:t>14.03.2012</a:t>
+              <a:t>19.03.2012</a:t>
             </a:fld>
             <a:endParaRPr lang="en-US"/>
           </a:p>
@@ -2688,7 +2691,7 @@
             <a:fld id="{3F906118-738F-1C4E-8D54-680CFAF96838}" type="datetimeFigureOut">
               <a:rPr lang="de-DE" smtClean="0"/>
               <a:pPr/>
-              <a:t>14.03.2012</a:t>
+              <a:t>19.03.2012</a:t>
             </a:fld>
             <a:endParaRPr lang="en-US"/>
           </a:p>
@@ -4314,6 +4317,2146 @@
             <a:p>
               <a:pPr algn="ctr"/>
               <a:endParaRPr lang="en-US"/>
+            </a:p>
+          </p:txBody>
+        </p:sp>
+      </p:grpSp>
+    </p:spTree>
+  </p:cSld>
+  <p:clrMapOvr>
+    <a:masterClrMapping/>
+  </p:clrMapOvr>
+</p:sld>
+</file>
+
+<file path=ppt/slides/slide2.xml><?xml version="1.0" encoding="utf-8"?>
+<p:sld xmlns:a="http://schemas.openxmlformats.org/drawingml/2006/main" xmlns:r="http://schemas.openxmlformats.org/officeDocument/2006/relationships" xmlns:mc="http://schemas.openxmlformats.org/markup-compatibility/2006" xmlns:mv="urn:schemas-microsoft-com:mac:vml" xmlns:p="http://schemas.openxmlformats.org/presentationml/2006/main" mc:Ignorable="mv" mc:PreserveAttributes="mv:*">
+  <p:cSld>
+    <p:spTree>
+      <p:nvGrpSpPr>
+        <p:cNvPr id="1" name=""/>
+        <p:cNvGrpSpPr/>
+        <p:nvPr/>
+      </p:nvGrpSpPr>
+      <p:grpSpPr>
+        <a:xfrm>
+          <a:off x="0" y="0"/>
+          <a:ext cx="0" cy="0"/>
+          <a:chOff x="0" y="0"/>
+          <a:chExt cx="0" cy="0"/>
+        </a:xfrm>
+      </p:grpSpPr>
+      <p:grpSp>
+        <p:nvGrpSpPr>
+          <p:cNvPr id="9" name="Gruppierung 8"/>
+          <p:cNvGrpSpPr/>
+          <p:nvPr/>
+        </p:nvGrpSpPr>
+        <p:grpSpPr>
+          <a:xfrm>
+            <a:off x="2311407" y="3039533"/>
+            <a:ext cx="4571987" cy="795867"/>
+            <a:chOff x="2311407" y="3039533"/>
+            <a:chExt cx="4571987" cy="795867"/>
+          </a:xfrm>
+        </p:grpSpPr>
+        <p:sp>
+          <p:nvSpPr>
+            <p:cNvPr id="4" name="Rechteck 3"/>
+            <p:cNvSpPr/>
+            <p:nvPr/>
+          </p:nvSpPr>
+          <p:spPr>
+            <a:xfrm>
+              <a:off x="4034366" y="3039533"/>
+              <a:ext cx="1075267" cy="778933"/>
+            </a:xfrm>
+            <a:prstGeom prst="rect">
+              <a:avLst/>
+            </a:prstGeom>
+            <a:solidFill>
+              <a:schemeClr val="bg1"/>
+            </a:solidFill>
+            <a:ln>
+              <a:solidFill>
+                <a:schemeClr val="tx1"/>
+              </a:solidFill>
+            </a:ln>
+          </p:spPr>
+          <p:style>
+            <a:lnRef idx="1">
+              <a:schemeClr val="accent1"/>
+            </a:lnRef>
+            <a:fillRef idx="3">
+              <a:schemeClr val="accent1"/>
+            </a:fillRef>
+            <a:effectRef idx="2">
+              <a:schemeClr val="accent1"/>
+            </a:effectRef>
+            <a:fontRef idx="minor">
+              <a:schemeClr val="lt1"/>
+            </a:fontRef>
+          </p:style>
+          <p:txBody>
+            <a:bodyPr rtlCol="0" anchor="ctr"/>
+            <a:lstStyle/>
+            <a:p>
+              <a:pPr algn="ctr"/>
+              <a:r>
+                <a:rPr lang="en-US" dirty="0" smtClean="0">
+                  <a:solidFill>
+                    <a:srgbClr val="000000"/>
+                  </a:solidFill>
+                </a:rPr>
+                <a:t>FFT</a:t>
+              </a:r>
+              <a:endParaRPr lang="en-US" dirty="0">
+                <a:solidFill>
+                  <a:srgbClr val="000000"/>
+                </a:solidFill>
+              </a:endParaRPr>
+            </a:p>
+          </p:txBody>
+        </p:sp>
+        <p:sp>
+          <p:nvSpPr>
+            <p:cNvPr id="5" name="Sechseck 4"/>
+            <p:cNvSpPr/>
+            <p:nvPr/>
+          </p:nvSpPr>
+          <p:spPr>
+            <a:xfrm>
+              <a:off x="2311407" y="3039533"/>
+              <a:ext cx="1016000" cy="795867"/>
+            </a:xfrm>
+            <a:prstGeom prst="hexagon">
+              <a:avLst/>
+            </a:prstGeom>
+            <a:solidFill>
+              <a:schemeClr val="bg1"/>
+            </a:solidFill>
+            <a:ln>
+              <a:solidFill>
+                <a:schemeClr val="tx1"/>
+              </a:solidFill>
+            </a:ln>
+          </p:spPr>
+          <p:style>
+            <a:lnRef idx="1">
+              <a:schemeClr val="accent1"/>
+            </a:lnRef>
+            <a:fillRef idx="3">
+              <a:schemeClr val="accent1"/>
+            </a:fillRef>
+            <a:effectRef idx="2">
+              <a:schemeClr val="accent1"/>
+            </a:effectRef>
+            <a:fontRef idx="minor">
+              <a:schemeClr val="lt1"/>
+            </a:fontRef>
+          </p:style>
+          <p:txBody>
+            <a:bodyPr lIns="36000" rIns="36000" rtlCol="0" anchor="ctr"/>
+            <a:lstStyle/>
+            <a:p>
+              <a:pPr algn="ctr"/>
+              <a:r>
+                <a:rPr lang="en-US" dirty="0" smtClean="0">
+                  <a:solidFill>
+                    <a:srgbClr val="000000"/>
+                  </a:solidFill>
+                </a:rPr>
+                <a:t>Sensor</a:t>
+              </a:r>
+              <a:endParaRPr lang="en-US" dirty="0">
+                <a:solidFill>
+                  <a:srgbClr val="000000"/>
+                </a:solidFill>
+              </a:endParaRPr>
+            </a:p>
+          </p:txBody>
+        </p:sp>
+        <p:sp>
+          <p:nvSpPr>
+            <p:cNvPr id="6" name="Rechteck 5"/>
+            <p:cNvSpPr/>
+            <p:nvPr/>
+          </p:nvSpPr>
+          <p:spPr>
+            <a:xfrm>
+              <a:off x="5926660" y="3039533"/>
+              <a:ext cx="956734" cy="778933"/>
+            </a:xfrm>
+            <a:prstGeom prst="rect">
+              <a:avLst/>
+            </a:prstGeom>
+            <a:solidFill>
+              <a:schemeClr val="bg1"/>
+            </a:solidFill>
+            <a:ln>
+              <a:solidFill>
+                <a:schemeClr val="tx1"/>
+              </a:solidFill>
+            </a:ln>
+          </p:spPr>
+          <p:style>
+            <a:lnRef idx="1">
+              <a:schemeClr val="accent1"/>
+            </a:lnRef>
+            <a:fillRef idx="3">
+              <a:schemeClr val="accent1"/>
+            </a:fillRef>
+            <a:effectRef idx="2">
+              <a:schemeClr val="accent1"/>
+            </a:effectRef>
+            <a:fontRef idx="minor">
+              <a:schemeClr val="lt1"/>
+            </a:fontRef>
+          </p:style>
+          <p:txBody>
+            <a:bodyPr lIns="36000" rIns="36000" rtlCol="0" anchor="ctr"/>
+            <a:lstStyle/>
+            <a:p>
+              <a:pPr algn="ctr"/>
+              <a:r>
+                <a:rPr lang="en-US" dirty="0" smtClean="0">
+                  <a:solidFill>
+                    <a:srgbClr val="000000"/>
+                  </a:solidFill>
+                </a:rPr>
+                <a:t>SoCWire</a:t>
+              </a:r>
+              <a:br>
+                <a:rPr lang="en-US" dirty="0" smtClean="0">
+                  <a:solidFill>
+                    <a:srgbClr val="000000"/>
+                  </a:solidFill>
+                </a:rPr>
+              </a:br>
+              <a:r>
+                <a:rPr lang="en-US" dirty="0" smtClean="0">
+                  <a:solidFill>
+                    <a:srgbClr val="000000"/>
+                  </a:solidFill>
+                </a:rPr>
+                <a:t>Link</a:t>
+              </a:r>
+              <a:endParaRPr lang="en-US" dirty="0">
+                <a:solidFill>
+                  <a:srgbClr val="000000"/>
+                </a:solidFill>
+              </a:endParaRPr>
+            </a:p>
+          </p:txBody>
+        </p:sp>
+        <p:sp>
+          <p:nvSpPr>
+            <p:cNvPr id="7" name="Pfeil nach rechts 6"/>
+            <p:cNvSpPr/>
+            <p:nvPr/>
+          </p:nvSpPr>
+          <p:spPr>
+            <a:xfrm>
+              <a:off x="3454400" y="3365500"/>
+              <a:ext cx="465667" cy="143933"/>
+            </a:xfrm>
+            <a:prstGeom prst="rightArrow">
+              <a:avLst/>
+            </a:prstGeom>
+            <a:solidFill>
+              <a:schemeClr val="bg1"/>
+            </a:solidFill>
+            <a:ln>
+              <a:solidFill>
+                <a:schemeClr val="tx1"/>
+              </a:solidFill>
+            </a:ln>
+          </p:spPr>
+          <p:style>
+            <a:lnRef idx="1">
+              <a:schemeClr val="accent1"/>
+            </a:lnRef>
+            <a:fillRef idx="3">
+              <a:schemeClr val="accent1"/>
+            </a:fillRef>
+            <a:effectRef idx="2">
+              <a:schemeClr val="accent1"/>
+            </a:effectRef>
+            <a:fontRef idx="minor">
+              <a:schemeClr val="lt1"/>
+            </a:fontRef>
+          </p:style>
+          <p:txBody>
+            <a:bodyPr rtlCol="0" anchor="ctr"/>
+            <a:lstStyle/>
+            <a:p>
+              <a:pPr algn="ctr"/>
+              <a:endParaRPr lang="en-US"/>
+            </a:p>
+          </p:txBody>
+        </p:sp>
+        <p:sp>
+          <p:nvSpPr>
+            <p:cNvPr id="8" name="Pfeil nach rechts 7"/>
+            <p:cNvSpPr/>
+            <p:nvPr/>
+          </p:nvSpPr>
+          <p:spPr>
+            <a:xfrm>
+              <a:off x="5300132" y="3357033"/>
+              <a:ext cx="465667" cy="143933"/>
+            </a:xfrm>
+            <a:prstGeom prst="rightArrow">
+              <a:avLst/>
+            </a:prstGeom>
+            <a:solidFill>
+              <a:schemeClr val="bg1"/>
+            </a:solidFill>
+            <a:ln>
+              <a:solidFill>
+                <a:schemeClr val="tx1"/>
+              </a:solidFill>
+            </a:ln>
+          </p:spPr>
+          <p:style>
+            <a:lnRef idx="1">
+              <a:schemeClr val="accent1"/>
+            </a:lnRef>
+            <a:fillRef idx="3">
+              <a:schemeClr val="accent1"/>
+            </a:fillRef>
+            <a:effectRef idx="2">
+              <a:schemeClr val="accent1"/>
+            </a:effectRef>
+            <a:fontRef idx="minor">
+              <a:schemeClr val="lt1"/>
+            </a:fontRef>
+          </p:style>
+          <p:txBody>
+            <a:bodyPr rtlCol="0" anchor="ctr"/>
+            <a:lstStyle/>
+            <a:p>
+              <a:pPr algn="ctr"/>
+              <a:endParaRPr lang="en-US"/>
+            </a:p>
+          </p:txBody>
+        </p:sp>
+      </p:grpSp>
+    </p:spTree>
+  </p:cSld>
+  <p:clrMapOvr>
+    <a:masterClrMapping/>
+  </p:clrMapOvr>
+</p:sld>
+</file>
+
+<file path=ppt/slides/slide3.xml><?xml version="1.0" encoding="utf-8"?>
+<p:sld xmlns:a="http://schemas.openxmlformats.org/drawingml/2006/main" xmlns:r="http://schemas.openxmlformats.org/officeDocument/2006/relationships" xmlns:mc="http://schemas.openxmlformats.org/markup-compatibility/2006" xmlns:mv="urn:schemas-microsoft-com:mac:vml" xmlns:p="http://schemas.openxmlformats.org/presentationml/2006/main" mc:Ignorable="mv" mc:PreserveAttributes="mv:*">
+  <p:cSld>
+    <p:spTree>
+      <p:nvGrpSpPr>
+        <p:cNvPr id="1" name=""/>
+        <p:cNvGrpSpPr/>
+        <p:nvPr/>
+      </p:nvGrpSpPr>
+      <p:grpSpPr>
+        <a:xfrm>
+          <a:off x="0" y="0"/>
+          <a:ext cx="0" cy="0"/>
+          <a:chOff x="0" y="0"/>
+          <a:chExt cx="0" cy="0"/>
+        </a:xfrm>
+      </p:grpSpPr>
+      <p:sp>
+        <p:nvSpPr>
+          <p:cNvPr id="4" name="Pfeil nach links und rechts 3"/>
+          <p:cNvSpPr/>
+          <p:nvPr/>
+        </p:nvSpPr>
+        <p:spPr>
+          <a:xfrm>
+            <a:off x="1490133" y="2929466"/>
+            <a:ext cx="3725334" cy="220134"/>
+          </a:xfrm>
+          <a:prstGeom prst="leftRightArrow">
+            <a:avLst/>
+          </a:prstGeom>
+          <a:solidFill>
+            <a:schemeClr val="bg1"/>
+          </a:solidFill>
+          <a:ln>
+            <a:solidFill>
+              <a:schemeClr val="tx1"/>
+            </a:solidFill>
+          </a:ln>
+        </p:spPr>
+        <p:style>
+          <a:lnRef idx="1">
+            <a:schemeClr val="accent1"/>
+          </a:lnRef>
+          <a:fillRef idx="3">
+            <a:schemeClr val="accent1"/>
+          </a:fillRef>
+          <a:effectRef idx="2">
+            <a:schemeClr val="accent1"/>
+          </a:effectRef>
+          <a:fontRef idx="minor">
+            <a:schemeClr val="lt1"/>
+          </a:fontRef>
+        </p:style>
+        <p:txBody>
+          <a:bodyPr rtlCol="0" anchor="ctr"/>
+          <a:lstStyle/>
+          <a:p>
+            <a:pPr algn="ctr"/>
+            <a:endParaRPr lang="en-US" sz="1400" dirty="0" smtClean="0">
+              <a:solidFill>
+                <a:srgbClr val="000000"/>
+              </a:solidFill>
+            </a:endParaRPr>
+          </a:p>
+        </p:txBody>
+      </p:sp>
+      <p:sp>
+        <p:nvSpPr>
+          <p:cNvPr id="5" name="Rechteck 4"/>
+          <p:cNvSpPr/>
+          <p:nvPr/>
+        </p:nvSpPr>
+        <p:spPr>
+          <a:xfrm>
+            <a:off x="2980271" y="1985425"/>
+            <a:ext cx="736601" cy="668866"/>
+          </a:xfrm>
+          <a:prstGeom prst="rect">
+            <a:avLst/>
+          </a:prstGeom>
+          <a:solidFill>
+            <a:schemeClr val="bg1"/>
+          </a:solidFill>
+          <a:ln>
+            <a:solidFill>
+              <a:schemeClr val="tx1"/>
+            </a:solidFill>
+          </a:ln>
+        </p:spPr>
+        <p:style>
+          <a:lnRef idx="1">
+            <a:schemeClr val="accent1"/>
+          </a:lnRef>
+          <a:fillRef idx="3">
+            <a:schemeClr val="accent1"/>
+          </a:fillRef>
+          <a:effectRef idx="2">
+            <a:schemeClr val="accent1"/>
+          </a:effectRef>
+          <a:fontRef idx="minor">
+            <a:schemeClr val="lt1"/>
+          </a:fontRef>
+        </p:style>
+        <p:txBody>
+          <a:bodyPr rtlCol="0" anchor="ctr"/>
+          <a:lstStyle/>
+          <a:p>
+            <a:pPr algn="ctr"/>
+            <a:r>
+              <a:rPr lang="en-US" sz="1400" dirty="0" smtClean="0">
+                <a:solidFill>
+                  <a:srgbClr val="000000"/>
+                </a:solidFill>
+              </a:rPr>
+              <a:t>LEON II</a:t>
+            </a:r>
+          </a:p>
+        </p:txBody>
+      </p:sp>
+      <p:sp>
+        <p:nvSpPr>
+          <p:cNvPr id="8" name="Rechteck 7"/>
+          <p:cNvSpPr/>
+          <p:nvPr/>
+        </p:nvSpPr>
+        <p:spPr>
+          <a:xfrm>
+            <a:off x="4203699" y="3420533"/>
+            <a:ext cx="736601" cy="668866"/>
+          </a:xfrm>
+          <a:prstGeom prst="rect">
+            <a:avLst/>
+          </a:prstGeom>
+          <a:solidFill>
+            <a:schemeClr val="bg1"/>
+          </a:solidFill>
+          <a:ln>
+            <a:solidFill>
+              <a:schemeClr val="tx1"/>
+            </a:solidFill>
+          </a:ln>
+        </p:spPr>
+        <p:style>
+          <a:lnRef idx="1">
+            <a:schemeClr val="accent1"/>
+          </a:lnRef>
+          <a:fillRef idx="3">
+            <a:schemeClr val="accent1"/>
+          </a:fillRef>
+          <a:effectRef idx="2">
+            <a:schemeClr val="accent1"/>
+          </a:effectRef>
+          <a:fontRef idx="minor">
+            <a:schemeClr val="lt1"/>
+          </a:fontRef>
+        </p:style>
+        <p:txBody>
+          <a:bodyPr rtlCol="0" anchor="ctr"/>
+          <a:lstStyle/>
+          <a:p>
+            <a:pPr algn="ctr"/>
+            <a:r>
+              <a:rPr lang="en-US" sz="1400" dirty="0" smtClean="0">
+                <a:solidFill>
+                  <a:srgbClr val="000000"/>
+                </a:solidFill>
+              </a:rPr>
+              <a:t>SoC</a:t>
+            </a:r>
+            <a:br>
+              <a:rPr lang="en-US" sz="1400" dirty="0" smtClean="0">
+                <a:solidFill>
+                  <a:srgbClr val="000000"/>
+                </a:solidFill>
+              </a:rPr>
+            </a:br>
+            <a:r>
+              <a:rPr lang="en-US" sz="1400" dirty="0" smtClean="0">
+                <a:solidFill>
+                  <a:srgbClr val="000000"/>
+                </a:solidFill>
+              </a:rPr>
+              <a:t>Wire</a:t>
+            </a:r>
+          </a:p>
+        </p:txBody>
+      </p:sp>
+      <p:cxnSp>
+        <p:nvCxnSpPr>
+          <p:cNvPr id="11" name="Gerade Verbindung mit Pfeil 10"/>
+          <p:cNvCxnSpPr/>
+          <p:nvPr/>
+        </p:nvCxnSpPr>
+        <p:spPr>
+          <a:xfrm rot="5400000">
+            <a:off x="4396318" y="3244851"/>
+            <a:ext cx="351364" cy="1588"/>
+          </a:xfrm>
+          <a:prstGeom prst="straightConnector1">
+            <a:avLst/>
+          </a:prstGeom>
+          <a:ln>
+            <a:solidFill>
+              <a:schemeClr val="tx1"/>
+            </a:solidFill>
+            <a:headEnd type="triangle"/>
+            <a:tailEnd type="triangle"/>
+          </a:ln>
+        </p:spPr>
+        <p:style>
+          <a:lnRef idx="2">
+            <a:schemeClr val="accent1"/>
+          </a:lnRef>
+          <a:fillRef idx="0">
+            <a:schemeClr val="accent1"/>
+          </a:fillRef>
+          <a:effectRef idx="1">
+            <a:schemeClr val="accent1"/>
+          </a:effectRef>
+          <a:fontRef idx="minor">
+            <a:schemeClr val="tx1"/>
+          </a:fontRef>
+        </p:style>
+      </p:cxnSp>
+      <p:sp>
+        <p:nvSpPr>
+          <p:cNvPr id="12" name="Rechteck 11"/>
+          <p:cNvSpPr/>
+          <p:nvPr/>
+        </p:nvSpPr>
+        <p:spPr>
+          <a:xfrm>
+            <a:off x="1740696" y="3429004"/>
+            <a:ext cx="736601" cy="355597"/>
+          </a:xfrm>
+          <a:prstGeom prst="rect">
+            <a:avLst/>
+          </a:prstGeom>
+          <a:solidFill>
+            <a:schemeClr val="bg1"/>
+          </a:solidFill>
+          <a:ln>
+            <a:solidFill>
+              <a:schemeClr val="tx1"/>
+            </a:solidFill>
+          </a:ln>
+        </p:spPr>
+        <p:style>
+          <a:lnRef idx="1">
+            <a:schemeClr val="accent1"/>
+          </a:lnRef>
+          <a:fillRef idx="3">
+            <a:schemeClr val="accent1"/>
+          </a:fillRef>
+          <a:effectRef idx="2">
+            <a:schemeClr val="accent1"/>
+          </a:effectRef>
+          <a:fontRef idx="minor">
+            <a:schemeClr val="lt1"/>
+          </a:fontRef>
+        </p:style>
+        <p:txBody>
+          <a:bodyPr rtlCol="0" anchor="ctr"/>
+          <a:lstStyle/>
+          <a:p>
+            <a:pPr algn="ctr"/>
+            <a:r>
+              <a:rPr lang="en-US" sz="1400" dirty="0" smtClean="0">
+                <a:solidFill>
+                  <a:srgbClr val="000000"/>
+                </a:solidFill>
+              </a:rPr>
+              <a:t>MCTRL</a:t>
+            </a:r>
+          </a:p>
+        </p:txBody>
+      </p:sp>
+      <p:sp>
+        <p:nvSpPr>
+          <p:cNvPr id="13" name="Rechteck 12"/>
+          <p:cNvSpPr/>
+          <p:nvPr/>
+        </p:nvSpPr>
+        <p:spPr>
+          <a:xfrm>
+            <a:off x="1752602" y="1985425"/>
+            <a:ext cx="736601" cy="668866"/>
+          </a:xfrm>
+          <a:prstGeom prst="rect">
+            <a:avLst/>
+          </a:prstGeom>
+          <a:solidFill>
+            <a:schemeClr val="bg1"/>
+          </a:solidFill>
+          <a:ln>
+            <a:solidFill>
+              <a:schemeClr val="tx1"/>
+            </a:solidFill>
+          </a:ln>
+        </p:spPr>
+        <p:style>
+          <a:lnRef idx="1">
+            <a:schemeClr val="accent1"/>
+          </a:lnRef>
+          <a:fillRef idx="3">
+            <a:schemeClr val="accent1"/>
+          </a:fillRef>
+          <a:effectRef idx="2">
+            <a:schemeClr val="accent1"/>
+          </a:effectRef>
+          <a:fontRef idx="minor">
+            <a:schemeClr val="lt1"/>
+          </a:fontRef>
+        </p:style>
+        <p:txBody>
+          <a:bodyPr rtlCol="0" anchor="ctr"/>
+          <a:lstStyle/>
+          <a:p>
+            <a:pPr algn="ctr"/>
+            <a:r>
+              <a:rPr lang="en-US" sz="1400" dirty="0" smtClean="0">
+                <a:solidFill>
+                  <a:srgbClr val="000000"/>
+                </a:solidFill>
+              </a:rPr>
+              <a:t>Input Sensor</a:t>
+            </a:r>
+            <a:endParaRPr lang="en-US" sz="1400" dirty="0">
+              <a:solidFill>
+                <a:srgbClr val="000000"/>
+              </a:solidFill>
+            </a:endParaRPr>
+          </a:p>
+        </p:txBody>
+      </p:sp>
+      <p:cxnSp>
+        <p:nvCxnSpPr>
+          <p:cNvPr id="20" name="Gerade Verbindung mit Pfeil 19"/>
+          <p:cNvCxnSpPr>
+            <a:endCxn id="12" idx="0"/>
+          </p:cNvCxnSpPr>
+          <p:nvPr/>
+        </p:nvCxnSpPr>
+        <p:spPr>
+          <a:xfrm rot="5400000">
+            <a:off x="1948129" y="3263907"/>
+            <a:ext cx="325966" cy="4229"/>
+          </a:xfrm>
+          <a:prstGeom prst="straightConnector1">
+            <a:avLst/>
+          </a:prstGeom>
+          <a:ln>
+            <a:solidFill>
+              <a:schemeClr val="tx1"/>
+            </a:solidFill>
+            <a:headEnd type="triangle"/>
+            <a:tailEnd type="triangle"/>
+          </a:ln>
+        </p:spPr>
+        <p:style>
+          <a:lnRef idx="2">
+            <a:schemeClr val="accent1"/>
+          </a:lnRef>
+          <a:fillRef idx="0">
+            <a:schemeClr val="accent1"/>
+          </a:fillRef>
+          <a:effectRef idx="1">
+            <a:schemeClr val="accent1"/>
+          </a:effectRef>
+          <a:fontRef idx="minor">
+            <a:schemeClr val="tx1"/>
+          </a:fontRef>
+        </p:style>
+      </p:cxnSp>
+      <p:sp>
+        <p:nvSpPr>
+          <p:cNvPr id="23" name="Rechteck 22"/>
+          <p:cNvSpPr/>
+          <p:nvPr/>
+        </p:nvSpPr>
+        <p:spPr>
+          <a:xfrm>
+            <a:off x="1740696" y="3937001"/>
+            <a:ext cx="253997" cy="728137"/>
+          </a:xfrm>
+          <a:prstGeom prst="rect">
+            <a:avLst/>
+          </a:prstGeom>
+          <a:solidFill>
+            <a:schemeClr val="bg1"/>
+          </a:solidFill>
+          <a:ln>
+            <a:solidFill>
+              <a:schemeClr val="tx1"/>
+            </a:solidFill>
+          </a:ln>
+        </p:spPr>
+        <p:style>
+          <a:lnRef idx="1">
+            <a:schemeClr val="accent1"/>
+          </a:lnRef>
+          <a:fillRef idx="3">
+            <a:schemeClr val="accent1"/>
+          </a:fillRef>
+          <a:effectRef idx="2">
+            <a:schemeClr val="accent1"/>
+          </a:effectRef>
+          <a:fontRef idx="minor">
+            <a:schemeClr val="lt1"/>
+          </a:fontRef>
+        </p:style>
+        <p:txBody>
+          <a:bodyPr rtlCol="0" anchor="ctr"/>
+          <a:lstStyle/>
+          <a:p>
+            <a:pPr algn="ctr"/>
+            <a:r>
+              <a:rPr lang="en-US" sz="1000" dirty="0" smtClean="0">
+                <a:solidFill>
+                  <a:srgbClr val="000000"/>
+                </a:solidFill>
+              </a:rPr>
+              <a:t> SRAM</a:t>
+            </a:r>
+          </a:p>
+        </p:txBody>
+      </p:sp>
+      <p:sp>
+        <p:nvSpPr>
+          <p:cNvPr id="24" name="Rechteck 23"/>
+          <p:cNvSpPr/>
+          <p:nvPr/>
+        </p:nvSpPr>
+        <p:spPr>
+          <a:xfrm>
+            <a:off x="2231767" y="3937001"/>
+            <a:ext cx="253997" cy="728137"/>
+          </a:xfrm>
+          <a:prstGeom prst="rect">
+            <a:avLst/>
+          </a:prstGeom>
+          <a:solidFill>
+            <a:schemeClr val="bg1"/>
+          </a:solidFill>
+          <a:ln>
+            <a:solidFill>
+              <a:schemeClr val="tx1"/>
+            </a:solidFill>
+          </a:ln>
+        </p:spPr>
+        <p:style>
+          <a:lnRef idx="1">
+            <a:schemeClr val="accent1"/>
+          </a:lnRef>
+          <a:fillRef idx="3">
+            <a:schemeClr val="accent1"/>
+          </a:fillRef>
+          <a:effectRef idx="2">
+            <a:schemeClr val="accent1"/>
+          </a:effectRef>
+          <a:fontRef idx="minor">
+            <a:schemeClr val="lt1"/>
+          </a:fontRef>
+        </p:style>
+        <p:txBody>
+          <a:bodyPr rtlCol="0" anchor="ctr"/>
+          <a:lstStyle/>
+          <a:p>
+            <a:pPr algn="ctr"/>
+            <a:r>
+              <a:rPr lang="en-US" sz="1000" dirty="0" smtClean="0">
+                <a:solidFill>
+                  <a:srgbClr val="000000"/>
+                </a:solidFill>
+              </a:rPr>
+              <a:t> ROM</a:t>
+            </a:r>
+          </a:p>
+        </p:txBody>
+      </p:sp>
+      <p:cxnSp>
+        <p:nvCxnSpPr>
+          <p:cNvPr id="27" name="Gerade Verbindung 26"/>
+          <p:cNvCxnSpPr>
+            <a:endCxn id="23" idx="0"/>
+          </p:cNvCxnSpPr>
+          <p:nvPr/>
+        </p:nvCxnSpPr>
+        <p:spPr>
+          <a:xfrm rot="5400000">
+            <a:off x="1791497" y="3860801"/>
+            <a:ext cx="152398" cy="2"/>
+          </a:xfrm>
+          <a:prstGeom prst="line">
+            <a:avLst/>
+          </a:prstGeom>
+          <a:ln>
+            <a:solidFill>
+              <a:schemeClr val="tx1"/>
+            </a:solidFill>
+          </a:ln>
+        </p:spPr>
+        <p:style>
+          <a:lnRef idx="2">
+            <a:schemeClr val="accent1"/>
+          </a:lnRef>
+          <a:fillRef idx="0">
+            <a:schemeClr val="accent1"/>
+          </a:fillRef>
+          <a:effectRef idx="1">
+            <a:schemeClr val="accent1"/>
+          </a:effectRef>
+          <a:fontRef idx="minor">
+            <a:schemeClr val="tx1"/>
+          </a:fontRef>
+        </p:style>
+      </p:cxnSp>
+      <p:cxnSp>
+        <p:nvCxnSpPr>
+          <p:cNvPr id="29" name="Gerade Verbindung 28"/>
+          <p:cNvCxnSpPr/>
+          <p:nvPr/>
+        </p:nvCxnSpPr>
+        <p:spPr>
+          <a:xfrm rot="5400000">
+            <a:off x="2282559" y="3860799"/>
+            <a:ext cx="152398" cy="2"/>
+          </a:xfrm>
+          <a:prstGeom prst="line">
+            <a:avLst/>
+          </a:prstGeom>
+          <a:ln>
+            <a:solidFill>
+              <a:schemeClr val="tx1"/>
+            </a:solidFill>
+          </a:ln>
+        </p:spPr>
+        <p:style>
+          <a:lnRef idx="2">
+            <a:schemeClr val="accent1"/>
+          </a:lnRef>
+          <a:fillRef idx="0">
+            <a:schemeClr val="accent1"/>
+          </a:fillRef>
+          <a:effectRef idx="1">
+            <a:schemeClr val="accent1"/>
+          </a:effectRef>
+          <a:fontRef idx="minor">
+            <a:schemeClr val="tx1"/>
+          </a:fontRef>
+        </p:style>
+      </p:cxnSp>
+      <p:cxnSp>
+        <p:nvCxnSpPr>
+          <p:cNvPr id="51" name="Form 50"/>
+          <p:cNvCxnSpPr/>
+          <p:nvPr/>
+        </p:nvCxnSpPr>
+        <p:spPr>
+          <a:xfrm rot="5400000" flipH="1" flipV="1">
+            <a:off x="3962012" y="3353192"/>
+            <a:ext cx="8467" cy="498746"/>
+          </a:xfrm>
+          <a:prstGeom prst="bentConnector4">
+            <a:avLst>
+              <a:gd name="adj1" fmla="val -1449970"/>
+              <a:gd name="adj2" fmla="val 61034"/>
+            </a:avLst>
+          </a:prstGeom>
+          <a:ln>
+            <a:solidFill>
+              <a:schemeClr val="tx1"/>
+            </a:solidFill>
+            <a:headEnd type="triangle"/>
+            <a:tailEnd type="triangle"/>
+          </a:ln>
+        </p:spPr>
+        <p:style>
+          <a:lnRef idx="2">
+            <a:schemeClr val="accent1"/>
+          </a:lnRef>
+          <a:fillRef idx="0">
+            <a:schemeClr val="accent1"/>
+          </a:fillRef>
+          <a:effectRef idx="1">
+            <a:schemeClr val="accent1"/>
+          </a:effectRef>
+          <a:fontRef idx="minor">
+            <a:schemeClr val="tx1"/>
+          </a:fontRef>
+        </p:style>
+      </p:cxnSp>
+      <p:cxnSp>
+        <p:nvCxnSpPr>
+          <p:cNvPr id="56" name="Gerade Verbindung mit Pfeil 55"/>
+          <p:cNvCxnSpPr/>
+          <p:nvPr/>
+        </p:nvCxnSpPr>
+        <p:spPr>
+          <a:xfrm rot="5400000">
+            <a:off x="3187699" y="2823639"/>
+            <a:ext cx="325966" cy="4229"/>
+          </a:xfrm>
+          <a:prstGeom prst="straightConnector1">
+            <a:avLst/>
+          </a:prstGeom>
+          <a:ln>
+            <a:solidFill>
+              <a:schemeClr val="tx1"/>
+            </a:solidFill>
+            <a:headEnd type="triangle"/>
+            <a:tailEnd type="triangle"/>
+          </a:ln>
+        </p:spPr>
+        <p:style>
+          <a:lnRef idx="2">
+            <a:schemeClr val="accent1"/>
+          </a:lnRef>
+          <a:fillRef idx="0">
+            <a:schemeClr val="accent1"/>
+          </a:fillRef>
+          <a:effectRef idx="1">
+            <a:schemeClr val="accent1"/>
+          </a:effectRef>
+          <a:fontRef idx="minor">
+            <a:schemeClr val="tx1"/>
+          </a:fontRef>
+        </p:style>
+      </p:cxnSp>
+      <p:cxnSp>
+        <p:nvCxnSpPr>
+          <p:cNvPr id="57" name="Gerade Verbindung mit Pfeil 56"/>
+          <p:cNvCxnSpPr>
+            <a:stCxn id="13" idx="2"/>
+          </p:cNvCxnSpPr>
+          <p:nvPr/>
+        </p:nvCxnSpPr>
+        <p:spPr>
+          <a:xfrm rot="16200000" flipH="1">
+            <a:off x="1954076" y="2821117"/>
+            <a:ext cx="334446" cy="793"/>
+          </a:xfrm>
+          <a:prstGeom prst="straightConnector1">
+            <a:avLst/>
+          </a:prstGeom>
+          <a:ln>
+            <a:solidFill>
+              <a:schemeClr val="tx1"/>
+            </a:solidFill>
+            <a:headEnd type="triangle"/>
+            <a:tailEnd type="triangle"/>
+          </a:ln>
+        </p:spPr>
+        <p:style>
+          <a:lnRef idx="2">
+            <a:schemeClr val="accent1"/>
+          </a:lnRef>
+          <a:fillRef idx="0">
+            <a:schemeClr val="accent1"/>
+          </a:fillRef>
+          <a:effectRef idx="1">
+            <a:schemeClr val="accent1"/>
+          </a:effectRef>
+          <a:fontRef idx="minor">
+            <a:schemeClr val="tx1"/>
+          </a:fontRef>
+        </p:style>
+      </p:cxnSp>
+      <p:sp>
+        <p:nvSpPr>
+          <p:cNvPr id="60" name="Rechteck 59"/>
+          <p:cNvSpPr/>
+          <p:nvPr/>
+        </p:nvSpPr>
+        <p:spPr>
+          <a:xfrm>
+            <a:off x="4309533" y="4089399"/>
+            <a:ext cx="93927" cy="50797"/>
+          </a:xfrm>
+          <a:prstGeom prst="rect">
+            <a:avLst/>
+          </a:prstGeom>
+          <a:solidFill>
+            <a:schemeClr val="bg1"/>
+          </a:solidFill>
+          <a:ln>
+            <a:solidFill>
+              <a:schemeClr val="tx1"/>
+            </a:solidFill>
+          </a:ln>
+        </p:spPr>
+        <p:style>
+          <a:lnRef idx="1">
+            <a:schemeClr val="accent1"/>
+          </a:lnRef>
+          <a:fillRef idx="3">
+            <a:schemeClr val="accent1"/>
+          </a:fillRef>
+          <a:effectRef idx="2">
+            <a:schemeClr val="accent1"/>
+          </a:effectRef>
+          <a:fontRef idx="minor">
+            <a:schemeClr val="lt1"/>
+          </a:fontRef>
+        </p:style>
+        <p:txBody>
+          <a:bodyPr rtlCol="0" anchor="ctr"/>
+          <a:lstStyle/>
+          <a:p>
+            <a:pPr algn="ctr"/>
+            <a:endParaRPr lang="en-US"/>
+          </a:p>
+        </p:txBody>
+      </p:sp>
+      <p:sp>
+        <p:nvSpPr>
+          <p:cNvPr id="61" name="Rechteck 60"/>
+          <p:cNvSpPr/>
+          <p:nvPr/>
+        </p:nvSpPr>
+        <p:spPr>
+          <a:xfrm>
+            <a:off x="4737100" y="4089399"/>
+            <a:ext cx="93927" cy="50797"/>
+          </a:xfrm>
+          <a:prstGeom prst="rect">
+            <a:avLst/>
+          </a:prstGeom>
+          <a:solidFill>
+            <a:schemeClr val="bg1"/>
+          </a:solidFill>
+          <a:ln>
+            <a:solidFill>
+              <a:schemeClr val="tx1"/>
+            </a:solidFill>
+          </a:ln>
+        </p:spPr>
+        <p:style>
+          <a:lnRef idx="1">
+            <a:schemeClr val="accent1"/>
+          </a:lnRef>
+          <a:fillRef idx="3">
+            <a:schemeClr val="accent1"/>
+          </a:fillRef>
+          <a:effectRef idx="2">
+            <a:schemeClr val="accent1"/>
+          </a:effectRef>
+          <a:fontRef idx="minor">
+            <a:schemeClr val="lt1"/>
+          </a:fontRef>
+        </p:style>
+        <p:txBody>
+          <a:bodyPr rtlCol="0" anchor="ctr"/>
+          <a:lstStyle/>
+          <a:p>
+            <a:pPr algn="ctr"/>
+            <a:endParaRPr lang="en-US"/>
+          </a:p>
+        </p:txBody>
+      </p:sp>
+      <p:sp>
+        <p:nvSpPr>
+          <p:cNvPr id="62" name="Textfeld 61"/>
+          <p:cNvSpPr txBox="1"/>
+          <p:nvPr/>
+        </p:nvSpPr>
+        <p:spPr>
+          <a:xfrm>
+            <a:off x="4195666" y="4076010"/>
+            <a:ext cx="320859" cy="246221"/>
+          </a:xfrm>
+          <a:prstGeom prst="rect">
+            <a:avLst/>
+          </a:prstGeom>
+          <a:noFill/>
+        </p:spPr>
+        <p:txBody>
+          <a:bodyPr wrap="none" rtlCol="0">
+            <a:spAutoFit/>
+          </a:bodyPr>
+          <a:lstStyle/>
+          <a:p>
+            <a:r>
+              <a:rPr lang="en-US" sz="1000" dirty="0" smtClean="0"/>
+              <a:t>RX</a:t>
+            </a:r>
+            <a:endParaRPr lang="en-US" sz="1000" dirty="0"/>
+          </a:p>
+        </p:txBody>
+      </p:sp>
+      <p:sp>
+        <p:nvSpPr>
+          <p:cNvPr id="63" name="Textfeld 62"/>
+          <p:cNvSpPr txBox="1"/>
+          <p:nvPr/>
+        </p:nvSpPr>
+        <p:spPr>
+          <a:xfrm>
+            <a:off x="4627907" y="4079901"/>
+            <a:ext cx="313720" cy="246221"/>
+          </a:xfrm>
+          <a:prstGeom prst="rect">
+            <a:avLst/>
+          </a:prstGeom>
+          <a:noFill/>
+        </p:spPr>
+        <p:txBody>
+          <a:bodyPr wrap="none" rtlCol="0">
+            <a:spAutoFit/>
+          </a:bodyPr>
+          <a:lstStyle/>
+          <a:p>
+            <a:r>
+              <a:rPr lang="en-US" sz="1000" dirty="0" smtClean="0"/>
+              <a:t>TX</a:t>
+            </a:r>
+            <a:endParaRPr lang="en-US" sz="1000" dirty="0"/>
+          </a:p>
+        </p:txBody>
+      </p:sp>
+      <p:sp>
+        <p:nvSpPr>
+          <p:cNvPr id="65" name="Textfeld 64"/>
+          <p:cNvSpPr txBox="1"/>
+          <p:nvPr/>
+        </p:nvSpPr>
+        <p:spPr>
+          <a:xfrm>
+            <a:off x="4060500" y="2724089"/>
+            <a:ext cx="498066" cy="307777"/>
+          </a:xfrm>
+          <a:prstGeom prst="rect">
+            <a:avLst/>
+          </a:prstGeom>
+          <a:noFill/>
+        </p:spPr>
+        <p:txBody>
+          <a:bodyPr wrap="none" rtlCol="0">
+            <a:spAutoFit/>
+          </a:bodyPr>
+          <a:lstStyle/>
+          <a:p>
+            <a:r>
+              <a:rPr lang="en-US" sz="1400" dirty="0" smtClean="0"/>
+              <a:t>AHB</a:t>
+            </a:r>
+            <a:endParaRPr lang="en-US" sz="1400" dirty="0"/>
+          </a:p>
+        </p:txBody>
+      </p:sp>
+      <p:sp>
+        <p:nvSpPr>
+          <p:cNvPr id="31" name="Pfeil nach links und rechts 30"/>
+          <p:cNvSpPr/>
+          <p:nvPr/>
+        </p:nvSpPr>
+        <p:spPr>
+          <a:xfrm>
+            <a:off x="2872714" y="3386665"/>
+            <a:ext cx="948265" cy="220134"/>
+          </a:xfrm>
+          <a:prstGeom prst="leftRightArrow">
+            <a:avLst/>
+          </a:prstGeom>
+          <a:solidFill>
+            <a:schemeClr val="bg1"/>
+          </a:solidFill>
+          <a:ln>
+            <a:solidFill>
+              <a:schemeClr val="tx1"/>
+            </a:solidFill>
+          </a:ln>
+        </p:spPr>
+        <p:style>
+          <a:lnRef idx="1">
+            <a:schemeClr val="accent1"/>
+          </a:lnRef>
+          <a:fillRef idx="3">
+            <a:schemeClr val="accent1"/>
+          </a:fillRef>
+          <a:effectRef idx="2">
+            <a:schemeClr val="accent1"/>
+          </a:effectRef>
+          <a:fontRef idx="minor">
+            <a:schemeClr val="lt1"/>
+          </a:fontRef>
+        </p:style>
+        <p:txBody>
+          <a:bodyPr rtlCol="0" anchor="ctr"/>
+          <a:lstStyle/>
+          <a:p>
+            <a:pPr algn="ctr"/>
+            <a:endParaRPr lang="en-US" sz="1400" dirty="0" smtClean="0">
+              <a:solidFill>
+                <a:srgbClr val="000000"/>
+              </a:solidFill>
+            </a:endParaRPr>
+          </a:p>
+        </p:txBody>
+      </p:sp>
+      <p:cxnSp>
+        <p:nvCxnSpPr>
+          <p:cNvPr id="32" name="Gerade Verbindung mit Pfeil 31"/>
+          <p:cNvCxnSpPr/>
+          <p:nvPr/>
+        </p:nvCxnSpPr>
+        <p:spPr>
+          <a:xfrm rot="5400000">
+            <a:off x="3190216" y="3255437"/>
+            <a:ext cx="325966" cy="4229"/>
+          </a:xfrm>
+          <a:prstGeom prst="straightConnector1">
+            <a:avLst/>
+          </a:prstGeom>
+          <a:ln>
+            <a:solidFill>
+              <a:schemeClr val="tx1"/>
+            </a:solidFill>
+            <a:headEnd type="triangle"/>
+            <a:tailEnd type="triangle"/>
+          </a:ln>
+        </p:spPr>
+        <p:style>
+          <a:lnRef idx="2">
+            <a:schemeClr val="accent1"/>
+          </a:lnRef>
+          <a:fillRef idx="0">
+            <a:schemeClr val="accent1"/>
+          </a:fillRef>
+          <a:effectRef idx="1">
+            <a:schemeClr val="accent1"/>
+          </a:effectRef>
+          <a:fontRef idx="minor">
+            <a:schemeClr val="tx1"/>
+          </a:fontRef>
+        </p:style>
+      </p:cxnSp>
+      <p:sp>
+        <p:nvSpPr>
+          <p:cNvPr id="33" name="Rechteck 32"/>
+          <p:cNvSpPr/>
+          <p:nvPr/>
+        </p:nvSpPr>
+        <p:spPr>
+          <a:xfrm>
+            <a:off x="2766086" y="3814230"/>
+            <a:ext cx="545307" cy="355597"/>
+          </a:xfrm>
+          <a:prstGeom prst="rect">
+            <a:avLst/>
+          </a:prstGeom>
+          <a:solidFill>
+            <a:schemeClr val="bg1"/>
+          </a:solidFill>
+          <a:ln>
+            <a:solidFill>
+              <a:schemeClr val="tx1"/>
+            </a:solidFill>
+          </a:ln>
+        </p:spPr>
+        <p:style>
+          <a:lnRef idx="1">
+            <a:schemeClr val="accent1"/>
+          </a:lnRef>
+          <a:fillRef idx="3">
+            <a:schemeClr val="accent1"/>
+          </a:fillRef>
+          <a:effectRef idx="2">
+            <a:schemeClr val="accent1"/>
+          </a:effectRef>
+          <a:fontRef idx="minor">
+            <a:schemeClr val="lt1"/>
+          </a:fontRef>
+        </p:style>
+        <p:txBody>
+          <a:bodyPr lIns="36000" rIns="36000" rtlCol="0" anchor="ctr"/>
+          <a:lstStyle/>
+          <a:p>
+            <a:pPr algn="ctr"/>
+            <a:r>
+              <a:rPr lang="en-US" sz="1200" dirty="0" smtClean="0">
+                <a:solidFill>
+                  <a:srgbClr val="000000"/>
+                </a:solidFill>
+              </a:rPr>
+              <a:t>IRQMP</a:t>
+            </a:r>
+          </a:p>
+        </p:txBody>
+      </p:sp>
+      <p:sp>
+        <p:nvSpPr>
+          <p:cNvPr id="34" name="Rechteck 33"/>
+          <p:cNvSpPr/>
+          <p:nvPr/>
+        </p:nvSpPr>
+        <p:spPr>
+          <a:xfrm>
+            <a:off x="3395138" y="3814230"/>
+            <a:ext cx="545307" cy="355597"/>
+          </a:xfrm>
+          <a:prstGeom prst="rect">
+            <a:avLst/>
+          </a:prstGeom>
+          <a:solidFill>
+            <a:schemeClr val="bg1"/>
+          </a:solidFill>
+          <a:ln>
+            <a:solidFill>
+              <a:schemeClr val="tx1"/>
+            </a:solidFill>
+          </a:ln>
+        </p:spPr>
+        <p:style>
+          <a:lnRef idx="1">
+            <a:schemeClr val="accent1"/>
+          </a:lnRef>
+          <a:fillRef idx="3">
+            <a:schemeClr val="accent1"/>
+          </a:fillRef>
+          <a:effectRef idx="2">
+            <a:schemeClr val="accent1"/>
+          </a:effectRef>
+          <a:fontRef idx="minor">
+            <a:schemeClr val="lt1"/>
+          </a:fontRef>
+        </p:style>
+        <p:txBody>
+          <a:bodyPr rtlCol="0" anchor="ctr"/>
+          <a:lstStyle/>
+          <a:p>
+            <a:pPr algn="ctr"/>
+            <a:r>
+              <a:rPr lang="en-US" sz="1000" dirty="0" smtClean="0">
+                <a:solidFill>
+                  <a:srgbClr val="000000"/>
+                </a:solidFill>
+              </a:rPr>
+              <a:t>Timer</a:t>
+            </a:r>
+          </a:p>
+        </p:txBody>
+      </p:sp>
+      <p:cxnSp>
+        <p:nvCxnSpPr>
+          <p:cNvPr id="36" name="Gerade Verbindung mit Pfeil 35"/>
+          <p:cNvCxnSpPr/>
+          <p:nvPr/>
+        </p:nvCxnSpPr>
+        <p:spPr>
+          <a:xfrm rot="5400000">
+            <a:off x="3045489" y="3678766"/>
+            <a:ext cx="270928" cy="4"/>
+          </a:xfrm>
+          <a:prstGeom prst="straightConnector1">
+            <a:avLst/>
+          </a:prstGeom>
+          <a:ln>
+            <a:solidFill>
+              <a:schemeClr val="tx1"/>
+            </a:solidFill>
+            <a:headEnd type="triangle"/>
+            <a:tailEnd type="triangle"/>
+          </a:ln>
+        </p:spPr>
+        <p:style>
+          <a:lnRef idx="2">
+            <a:schemeClr val="accent1"/>
+          </a:lnRef>
+          <a:fillRef idx="0">
+            <a:schemeClr val="accent1"/>
+          </a:fillRef>
+          <a:effectRef idx="1">
+            <a:schemeClr val="accent1"/>
+          </a:effectRef>
+          <a:fontRef idx="minor">
+            <a:schemeClr val="tx1"/>
+          </a:fontRef>
+        </p:style>
+      </p:cxnSp>
+      <p:cxnSp>
+        <p:nvCxnSpPr>
+          <p:cNvPr id="38" name="Gerade Verbindung mit Pfeil 37"/>
+          <p:cNvCxnSpPr/>
+          <p:nvPr/>
+        </p:nvCxnSpPr>
+        <p:spPr>
+          <a:xfrm rot="5400000">
+            <a:off x="3397654" y="3678769"/>
+            <a:ext cx="270929" cy="1588"/>
+          </a:xfrm>
+          <a:prstGeom prst="straightConnector1">
+            <a:avLst/>
+          </a:prstGeom>
+          <a:ln>
+            <a:solidFill>
+              <a:schemeClr val="tx1"/>
+            </a:solidFill>
+            <a:headEnd type="triangle"/>
+            <a:tailEnd type="triangle"/>
+          </a:ln>
+        </p:spPr>
+        <p:style>
+          <a:lnRef idx="2">
+            <a:schemeClr val="accent1"/>
+          </a:lnRef>
+          <a:fillRef idx="0">
+            <a:schemeClr val="accent1"/>
+          </a:fillRef>
+          <a:effectRef idx="1">
+            <a:schemeClr val="accent1"/>
+          </a:effectRef>
+          <a:fontRef idx="minor">
+            <a:schemeClr val="tx1"/>
+          </a:fontRef>
+        </p:style>
+      </p:cxnSp>
+      <p:sp>
+        <p:nvSpPr>
+          <p:cNvPr id="66" name="Textfeld 65"/>
+          <p:cNvSpPr txBox="1"/>
+          <p:nvPr/>
+        </p:nvSpPr>
+        <p:spPr>
+          <a:xfrm>
+            <a:off x="2953884" y="3242389"/>
+            <a:ext cx="394872" cy="246221"/>
+          </a:xfrm>
+          <a:prstGeom prst="rect">
+            <a:avLst/>
+          </a:prstGeom>
+          <a:noFill/>
+        </p:spPr>
+        <p:txBody>
+          <a:bodyPr wrap="none" rtlCol="0">
+            <a:spAutoFit/>
+          </a:bodyPr>
+          <a:lstStyle/>
+          <a:p>
+            <a:r>
+              <a:rPr lang="en-US" sz="1000" dirty="0" smtClean="0"/>
+              <a:t>APB</a:t>
+            </a:r>
+            <a:endParaRPr lang="en-US" sz="1000" dirty="0"/>
+          </a:p>
+        </p:txBody>
+      </p:sp>
+      <p:cxnSp>
+        <p:nvCxnSpPr>
+          <p:cNvPr id="69" name="Form 68"/>
+          <p:cNvCxnSpPr/>
+          <p:nvPr/>
+        </p:nvCxnSpPr>
+        <p:spPr>
+          <a:xfrm>
+            <a:off x="2468025" y="3598331"/>
+            <a:ext cx="518989" cy="8468"/>
+          </a:xfrm>
+          <a:prstGeom prst="bentConnector4">
+            <a:avLst>
+              <a:gd name="adj1" fmla="val 36133"/>
+              <a:gd name="adj2" fmla="val 1499787"/>
+            </a:avLst>
+          </a:prstGeom>
+          <a:ln>
+            <a:solidFill>
+              <a:schemeClr val="tx1"/>
+            </a:solidFill>
+            <a:headEnd type="triangle"/>
+            <a:tailEnd type="triangle"/>
+          </a:ln>
+        </p:spPr>
+        <p:style>
+          <a:lnRef idx="2">
+            <a:schemeClr val="accent1"/>
+          </a:lnRef>
+          <a:fillRef idx="0">
+            <a:schemeClr val="accent1"/>
+          </a:fillRef>
+          <a:effectRef idx="1">
+            <a:schemeClr val="accent1"/>
+          </a:effectRef>
+          <a:fontRef idx="minor">
+            <a:schemeClr val="tx1"/>
+          </a:fontRef>
+        </p:style>
+      </p:cxnSp>
+    </p:spTree>
+  </p:cSld>
+  <p:clrMapOvr>
+    <a:masterClrMapping/>
+  </p:clrMapOvr>
+</p:sld>
+</file>
+
+<file path=ppt/slides/slide4.xml><?xml version="1.0" encoding="utf-8"?>
+<p:sld xmlns:a="http://schemas.openxmlformats.org/drawingml/2006/main" xmlns:r="http://schemas.openxmlformats.org/officeDocument/2006/relationships" xmlns:mc="http://schemas.openxmlformats.org/markup-compatibility/2006" xmlns:mv="urn:schemas-microsoft-com:mac:vml" xmlns:p="http://schemas.openxmlformats.org/presentationml/2006/main" mc:Ignorable="mv" mc:PreserveAttributes="mv:*">
+  <p:cSld>
+    <p:spTree>
+      <p:nvGrpSpPr>
+        <p:cNvPr id="1" name=""/>
+        <p:cNvGrpSpPr/>
+        <p:nvPr/>
+      </p:nvGrpSpPr>
+      <p:grpSpPr>
+        <a:xfrm>
+          <a:off x="0" y="0"/>
+          <a:ext cx="0" cy="0"/>
+          <a:chOff x="0" y="0"/>
+          <a:chExt cx="0" cy="0"/>
+        </a:xfrm>
+      </p:grpSpPr>
+      <p:grpSp>
+        <p:nvGrpSpPr>
+          <p:cNvPr id="18" name="Gruppierung 17"/>
+          <p:cNvGrpSpPr/>
+          <p:nvPr/>
+        </p:nvGrpSpPr>
+        <p:grpSpPr>
+          <a:xfrm>
+            <a:off x="1295400" y="795859"/>
+            <a:ext cx="4275557" cy="5469473"/>
+            <a:chOff x="1295400" y="795859"/>
+            <a:chExt cx="4275557" cy="5469473"/>
+          </a:xfrm>
+        </p:grpSpPr>
+        <p:sp>
+          <p:nvSpPr>
+            <p:cNvPr id="4" name="Rechteck 3"/>
+            <p:cNvSpPr/>
+            <p:nvPr/>
+          </p:nvSpPr>
+          <p:spPr>
+            <a:xfrm>
+              <a:off x="2108200" y="838193"/>
+              <a:ext cx="2142067" cy="5427139"/>
+            </a:xfrm>
+            <a:prstGeom prst="rect">
+              <a:avLst/>
+            </a:prstGeom>
+            <a:solidFill>
+              <a:schemeClr val="bg1"/>
+            </a:solidFill>
+            <a:ln>
+              <a:solidFill>
+                <a:schemeClr val="tx1"/>
+              </a:solidFill>
+            </a:ln>
+          </p:spPr>
+          <p:style>
+            <a:lnRef idx="1">
+              <a:schemeClr val="accent1"/>
+            </a:lnRef>
+            <a:fillRef idx="3">
+              <a:schemeClr val="accent1"/>
+            </a:fillRef>
+            <a:effectRef idx="2">
+              <a:schemeClr val="accent1"/>
+            </a:effectRef>
+            <a:fontRef idx="minor">
+              <a:schemeClr val="lt1"/>
+            </a:fontRef>
+          </p:style>
+          <p:txBody>
+            <a:bodyPr rtlCol="0" anchor="ctr"/>
+            <a:lstStyle/>
+            <a:p>
+              <a:pPr algn="ctr"/>
+              <a:endParaRPr lang="en-US"/>
+            </a:p>
+          </p:txBody>
+        </p:sp>
+        <p:sp>
+          <p:nvSpPr>
+            <p:cNvPr id="5" name="Rechteck 4"/>
+            <p:cNvSpPr/>
+            <p:nvPr/>
+          </p:nvSpPr>
+          <p:spPr>
+            <a:xfrm>
+              <a:off x="2108200" y="838195"/>
+              <a:ext cx="2142067" cy="710512"/>
+            </a:xfrm>
+            <a:prstGeom prst="rect">
+              <a:avLst/>
+            </a:prstGeom>
+            <a:solidFill>
+              <a:schemeClr val="bg1"/>
+            </a:solidFill>
+            <a:ln>
+              <a:solidFill>
+                <a:schemeClr val="tx1"/>
+              </a:solidFill>
+            </a:ln>
+          </p:spPr>
+          <p:style>
+            <a:lnRef idx="1">
+              <a:schemeClr val="accent1"/>
+            </a:lnRef>
+            <a:fillRef idx="3">
+              <a:schemeClr val="accent1"/>
+            </a:fillRef>
+            <a:effectRef idx="2">
+              <a:schemeClr val="accent1"/>
+            </a:effectRef>
+            <a:fontRef idx="minor">
+              <a:schemeClr val="lt1"/>
+            </a:fontRef>
+          </p:style>
+          <p:txBody>
+            <a:bodyPr rtlCol="0" anchor="ctr"/>
+            <a:lstStyle/>
+            <a:p>
+              <a:pPr algn="ctr"/>
+              <a:r>
+                <a:rPr lang="en-US" dirty="0" smtClean="0">
+                  <a:solidFill>
+                    <a:schemeClr val="tx1"/>
+                  </a:solidFill>
+                </a:rPr>
+                <a:t>PROM – 1MB</a:t>
+              </a:r>
+            </a:p>
+            <a:p>
+              <a:pPr algn="ctr"/>
+              <a:r>
+                <a:rPr lang="en-US" sz="1000" dirty="0" smtClean="0">
+                  <a:solidFill>
+                    <a:schemeClr val="tx1"/>
+                  </a:solidFill>
+                </a:rPr>
+                <a:t>(haddr: 0x000, hmask: 0xfff)</a:t>
+              </a:r>
+              <a:endParaRPr lang="en-US" sz="1000" dirty="0">
+                <a:solidFill>
+                  <a:schemeClr val="tx1"/>
+                </a:solidFill>
+              </a:endParaRPr>
+            </a:p>
+          </p:txBody>
+        </p:sp>
+        <p:sp>
+          <p:nvSpPr>
+            <p:cNvPr id="6" name="Rechteck 5"/>
+            <p:cNvSpPr/>
+            <p:nvPr/>
+          </p:nvSpPr>
+          <p:spPr>
+            <a:xfrm>
+              <a:off x="2112800" y="2132885"/>
+              <a:ext cx="2142067" cy="1981200"/>
+            </a:xfrm>
+            <a:prstGeom prst="rect">
+              <a:avLst/>
+            </a:prstGeom>
+            <a:solidFill>
+              <a:schemeClr val="bg1"/>
+            </a:solidFill>
+            <a:ln>
+              <a:solidFill>
+                <a:schemeClr val="tx1"/>
+              </a:solidFill>
+            </a:ln>
+          </p:spPr>
+          <p:style>
+            <a:lnRef idx="1">
+              <a:schemeClr val="accent1"/>
+            </a:lnRef>
+            <a:fillRef idx="3">
+              <a:schemeClr val="accent1"/>
+            </a:fillRef>
+            <a:effectRef idx="2">
+              <a:schemeClr val="accent1"/>
+            </a:effectRef>
+            <a:fontRef idx="minor">
+              <a:schemeClr val="lt1"/>
+            </a:fontRef>
+          </p:style>
+          <p:txBody>
+            <a:bodyPr rtlCol="0" anchor="ctr"/>
+            <a:lstStyle/>
+            <a:p>
+              <a:pPr algn="ctr"/>
+              <a:r>
+                <a:rPr lang="en-US" dirty="0" smtClean="0">
+                  <a:solidFill>
+                    <a:srgbClr val="000000"/>
+                  </a:solidFill>
+                </a:rPr>
+                <a:t>SDRAM – 16MB</a:t>
+              </a:r>
+              <a:br>
+                <a:rPr lang="en-US" dirty="0" smtClean="0">
+                  <a:solidFill>
+                    <a:srgbClr val="000000"/>
+                  </a:solidFill>
+                </a:rPr>
+              </a:br>
+              <a:r>
+                <a:rPr lang="en-US" sz="1000" dirty="0" smtClean="0">
+                  <a:solidFill>
+                    <a:srgbClr val="000000"/>
+                  </a:solidFill>
+                </a:rPr>
+                <a:t>(haddr: 0x400, hmask: 0xff0)</a:t>
+              </a:r>
+              <a:endParaRPr lang="en-US" sz="1000" dirty="0">
+                <a:solidFill>
+                  <a:srgbClr val="000000"/>
+                </a:solidFill>
+              </a:endParaRPr>
+            </a:p>
+          </p:txBody>
+        </p:sp>
+        <p:sp>
+          <p:nvSpPr>
+            <p:cNvPr id="7" name="Textfeld 6"/>
+            <p:cNvSpPr txBox="1"/>
+            <p:nvPr/>
+          </p:nvSpPr>
+          <p:spPr>
+            <a:xfrm>
+              <a:off x="1295400" y="795859"/>
+              <a:ext cx="825867" cy="246221"/>
+            </a:xfrm>
+            <a:prstGeom prst="rect">
+              <a:avLst/>
+            </a:prstGeom>
+            <a:noFill/>
+          </p:spPr>
+          <p:txBody>
+            <a:bodyPr wrap="none" rtlCol="0">
+              <a:spAutoFit/>
+            </a:bodyPr>
+            <a:lstStyle/>
+            <a:p>
+              <a:r>
+                <a:rPr lang="en-US" sz="1000" dirty="0" smtClean="0"/>
+                <a:t>0x00000000</a:t>
+              </a:r>
+              <a:endParaRPr lang="en-US" sz="1000" dirty="0"/>
+            </a:p>
+          </p:txBody>
+        </p:sp>
+        <p:sp>
+          <p:nvSpPr>
+            <p:cNvPr id="8" name="Textfeld 7"/>
+            <p:cNvSpPr txBox="1"/>
+            <p:nvPr/>
+          </p:nvSpPr>
+          <p:spPr>
+            <a:xfrm>
+              <a:off x="1295400" y="1345498"/>
+              <a:ext cx="825867" cy="246221"/>
+            </a:xfrm>
+            <a:prstGeom prst="rect">
+              <a:avLst/>
+            </a:prstGeom>
+            <a:noFill/>
+          </p:spPr>
+          <p:txBody>
+            <a:bodyPr wrap="none" rtlCol="0">
+              <a:spAutoFit/>
+            </a:bodyPr>
+            <a:lstStyle/>
+            <a:p>
+              <a:r>
+                <a:rPr lang="en-US" sz="1000" dirty="0" smtClean="0"/>
+                <a:t>0x00100000</a:t>
+              </a:r>
+              <a:endParaRPr lang="en-US" sz="1000" dirty="0"/>
+            </a:p>
+          </p:txBody>
+        </p:sp>
+        <p:sp>
+          <p:nvSpPr>
+            <p:cNvPr id="9" name="Textfeld 8"/>
+            <p:cNvSpPr txBox="1"/>
+            <p:nvPr/>
+          </p:nvSpPr>
+          <p:spPr>
+            <a:xfrm>
+              <a:off x="1316934" y="2090550"/>
+              <a:ext cx="825867" cy="246221"/>
+            </a:xfrm>
+            <a:prstGeom prst="rect">
+              <a:avLst/>
+            </a:prstGeom>
+            <a:noFill/>
+          </p:spPr>
+          <p:txBody>
+            <a:bodyPr wrap="none" rtlCol="0">
+              <a:spAutoFit/>
+            </a:bodyPr>
+            <a:lstStyle/>
+            <a:p>
+              <a:r>
+                <a:rPr lang="en-US" sz="1000" dirty="0" smtClean="0"/>
+                <a:t>0x40000000</a:t>
+              </a:r>
+              <a:endParaRPr lang="en-US" sz="1000" dirty="0"/>
+            </a:p>
+          </p:txBody>
+        </p:sp>
+        <p:sp>
+          <p:nvSpPr>
+            <p:cNvPr id="10" name="Textfeld 9"/>
+            <p:cNvSpPr txBox="1"/>
+            <p:nvPr/>
+          </p:nvSpPr>
+          <p:spPr>
+            <a:xfrm>
+              <a:off x="1312334" y="3918666"/>
+              <a:ext cx="825867" cy="246221"/>
+            </a:xfrm>
+            <a:prstGeom prst="rect">
+              <a:avLst/>
+            </a:prstGeom>
+            <a:noFill/>
+          </p:spPr>
+          <p:txBody>
+            <a:bodyPr wrap="none" rtlCol="0">
+              <a:spAutoFit/>
+            </a:bodyPr>
+            <a:lstStyle/>
+            <a:p>
+              <a:r>
+                <a:rPr lang="en-US" sz="1000" dirty="0" smtClean="0"/>
+                <a:t>0x41000000</a:t>
+              </a:r>
+              <a:endParaRPr lang="en-US" sz="1000" dirty="0"/>
+            </a:p>
+          </p:txBody>
+        </p:sp>
+        <p:sp>
+          <p:nvSpPr>
+            <p:cNvPr id="11" name="Textfeld 10"/>
+            <p:cNvSpPr txBox="1"/>
+            <p:nvPr/>
+          </p:nvSpPr>
+          <p:spPr>
+            <a:xfrm>
+              <a:off x="1316934" y="4613619"/>
+              <a:ext cx="825867" cy="246221"/>
+            </a:xfrm>
+            <a:prstGeom prst="rect">
+              <a:avLst/>
+            </a:prstGeom>
+            <a:noFill/>
+          </p:spPr>
+          <p:txBody>
+            <a:bodyPr wrap="none" rtlCol="0">
+              <a:spAutoFit/>
+            </a:bodyPr>
+            <a:lstStyle/>
+            <a:p>
+              <a:r>
+                <a:rPr lang="en-US" sz="1000" dirty="0" smtClean="0"/>
+                <a:t>0x80000000</a:t>
+              </a:r>
+              <a:endParaRPr lang="en-US" sz="1000" dirty="0"/>
+            </a:p>
+          </p:txBody>
+        </p:sp>
+        <p:sp>
+          <p:nvSpPr>
+            <p:cNvPr id="12" name="Textfeld 11"/>
+            <p:cNvSpPr txBox="1"/>
+            <p:nvPr/>
+          </p:nvSpPr>
+          <p:spPr>
+            <a:xfrm>
+              <a:off x="1312334" y="5181586"/>
+              <a:ext cx="825867" cy="246221"/>
+            </a:xfrm>
+            <a:prstGeom prst="rect">
+              <a:avLst/>
+            </a:prstGeom>
+            <a:noFill/>
+          </p:spPr>
+          <p:txBody>
+            <a:bodyPr wrap="none" rtlCol="0">
+              <a:spAutoFit/>
+            </a:bodyPr>
+            <a:lstStyle/>
+            <a:p>
+              <a:r>
+                <a:rPr lang="en-US" sz="1000" dirty="0" smtClean="0"/>
+                <a:t>0x80100000</a:t>
+              </a:r>
+              <a:endParaRPr lang="en-US" sz="1000" dirty="0"/>
+            </a:p>
+          </p:txBody>
+        </p:sp>
+        <p:sp>
+          <p:nvSpPr>
+            <p:cNvPr id="13" name="Rechteck 12"/>
+            <p:cNvSpPr/>
+            <p:nvPr/>
+          </p:nvSpPr>
+          <p:spPr>
+            <a:xfrm>
+              <a:off x="2112800" y="4674282"/>
+              <a:ext cx="2142067" cy="710512"/>
+            </a:xfrm>
+            <a:prstGeom prst="rect">
+              <a:avLst/>
+            </a:prstGeom>
+            <a:solidFill>
+              <a:schemeClr val="bg1"/>
+            </a:solidFill>
+            <a:ln>
+              <a:solidFill>
+                <a:schemeClr val="tx1"/>
+              </a:solidFill>
+            </a:ln>
+          </p:spPr>
+          <p:style>
+            <a:lnRef idx="1">
+              <a:schemeClr val="accent1"/>
+            </a:lnRef>
+            <a:fillRef idx="3">
+              <a:schemeClr val="accent1"/>
+            </a:fillRef>
+            <a:effectRef idx="2">
+              <a:schemeClr val="accent1"/>
+            </a:effectRef>
+            <a:fontRef idx="minor">
+              <a:schemeClr val="lt1"/>
+            </a:fontRef>
+          </p:style>
+          <p:txBody>
+            <a:bodyPr rtlCol="0" anchor="ctr"/>
+            <a:lstStyle/>
+            <a:p>
+              <a:pPr algn="ctr"/>
+              <a:r>
+                <a:rPr lang="en-US" dirty="0" smtClean="0">
+                  <a:solidFill>
+                    <a:schemeClr val="tx1"/>
+                  </a:solidFill>
+                </a:rPr>
+                <a:t>APBCTRL – 1MB</a:t>
+              </a:r>
+            </a:p>
+            <a:p>
+              <a:pPr algn="ctr"/>
+              <a:r>
+                <a:rPr lang="en-US" sz="1000" dirty="0" smtClean="0">
+                  <a:solidFill>
+                    <a:schemeClr val="tx1"/>
+                  </a:solidFill>
+                </a:rPr>
+                <a:t>(haddr: 0x800, hmask: 0xfff)</a:t>
+              </a:r>
+              <a:endParaRPr lang="en-US" sz="1000" dirty="0">
+                <a:solidFill>
+                  <a:schemeClr val="tx1"/>
+                </a:solidFill>
+              </a:endParaRPr>
+            </a:p>
+          </p:txBody>
+        </p:sp>
+        <p:sp>
+          <p:nvSpPr>
+            <p:cNvPr id="14" name="Geschweifte Klammer rechts 13"/>
+            <p:cNvSpPr/>
+            <p:nvPr/>
+          </p:nvSpPr>
+          <p:spPr>
+            <a:xfrm>
+              <a:off x="4368800" y="838195"/>
+              <a:ext cx="203200" cy="710512"/>
+            </a:xfrm>
+            <a:prstGeom prst="rightBrace">
+              <a:avLst/>
+            </a:prstGeom>
+            <a:ln>
+              <a:solidFill>
+                <a:schemeClr val="tx1"/>
+              </a:solidFill>
+            </a:ln>
+          </p:spPr>
+          <p:style>
+            <a:lnRef idx="2">
+              <a:schemeClr val="accent1"/>
+            </a:lnRef>
+            <a:fillRef idx="0">
+              <a:schemeClr val="accent1"/>
+            </a:fillRef>
+            <a:effectRef idx="1">
+              <a:schemeClr val="accent1"/>
+            </a:effectRef>
+            <a:fontRef idx="minor">
+              <a:schemeClr val="tx1"/>
+            </a:fontRef>
+          </p:style>
+          <p:txBody>
+            <a:bodyPr rtlCol="0" anchor="ctr"/>
+            <a:lstStyle/>
+            <a:p>
+              <a:pPr algn="ctr"/>
+              <a:endParaRPr lang="en-US"/>
+            </a:p>
+          </p:txBody>
+        </p:sp>
+        <p:sp>
+          <p:nvSpPr>
+            <p:cNvPr id="15" name="Geschweifte Klammer rechts 14"/>
+            <p:cNvSpPr/>
+            <p:nvPr/>
+          </p:nvSpPr>
+          <p:spPr>
+            <a:xfrm>
+              <a:off x="4368800" y="2132885"/>
+              <a:ext cx="203200" cy="1981200"/>
+            </a:xfrm>
+            <a:prstGeom prst="rightBrace">
+              <a:avLst/>
+            </a:prstGeom>
+            <a:ln>
+              <a:solidFill>
+                <a:schemeClr val="tx1"/>
+              </a:solidFill>
+            </a:ln>
+          </p:spPr>
+          <p:style>
+            <a:lnRef idx="2">
+              <a:schemeClr val="accent1"/>
+            </a:lnRef>
+            <a:fillRef idx="0">
+              <a:schemeClr val="accent1"/>
+            </a:fillRef>
+            <a:effectRef idx="1">
+              <a:schemeClr val="accent1"/>
+            </a:effectRef>
+            <a:fontRef idx="minor">
+              <a:schemeClr val="tx1"/>
+            </a:fontRef>
+          </p:style>
+          <p:txBody>
+            <a:bodyPr rtlCol="0" anchor="ctr"/>
+            <a:lstStyle/>
+            <a:p>
+              <a:pPr algn="ctr"/>
+              <a:endParaRPr lang="en-US"/>
+            </a:p>
+          </p:txBody>
+        </p:sp>
+        <p:sp>
+          <p:nvSpPr>
+            <p:cNvPr id="16" name="Textfeld 15"/>
+            <p:cNvSpPr txBox="1"/>
+            <p:nvPr/>
+          </p:nvSpPr>
+          <p:spPr>
+            <a:xfrm>
+              <a:off x="4562423" y="1025146"/>
+              <a:ext cx="1008534" cy="307777"/>
+            </a:xfrm>
+            <a:prstGeom prst="rect">
+              <a:avLst/>
+            </a:prstGeom>
+            <a:noFill/>
+          </p:spPr>
+          <p:txBody>
+            <a:bodyPr wrap="none" rtlCol="0">
+              <a:spAutoFit/>
+            </a:bodyPr>
+            <a:lstStyle/>
+            <a:p>
+              <a:r>
+                <a:rPr lang="en-US" sz="1400" dirty="0" smtClean="0"/>
+                <a:t>prom.sparc</a:t>
+              </a:r>
+              <a:endParaRPr lang="en-US" sz="1400" dirty="0"/>
+            </a:p>
+          </p:txBody>
+        </p:sp>
+        <p:sp>
+          <p:nvSpPr>
+            <p:cNvPr id="17" name="Textfeld 16"/>
+            <p:cNvSpPr txBox="1"/>
+            <p:nvPr/>
+          </p:nvSpPr>
+          <p:spPr>
+            <a:xfrm>
+              <a:off x="4570890" y="2964029"/>
+              <a:ext cx="966931" cy="307777"/>
+            </a:xfrm>
+            <a:prstGeom prst="rect">
+              <a:avLst/>
+            </a:prstGeom>
+            <a:noFill/>
+          </p:spPr>
+          <p:txBody>
+            <a:bodyPr wrap="none" rtlCol="0">
+              <a:spAutoFit/>
+            </a:bodyPr>
+            <a:lstStyle/>
+            <a:p>
+              <a:r>
+                <a:rPr lang="en-US" sz="1400" dirty="0" smtClean="0"/>
+                <a:t>fft64.sparc</a:t>
+              </a:r>
+              <a:endParaRPr lang="en-US" sz="1400" dirty="0"/>
             </a:p>
           </p:txBody>
         </p:sp>

</xml_diff>